<commit_message>
Hands On Demos - Day 8.
</commit_message>
<xml_diff>
--- a/3. Spring 5.0 (Core, MVC, REST, Data JPA, Data REST)/Day 7/Slides/7. Overview of JPA and Creating Your First Entity/overview-of-jpa-and-creating-your-first-entity-slides.pptx
+++ b/3. Spring 5.0 (Core, MVC, REST, Data JPA, Data REST)/Day 7/Slides/7. Overview of JPA and Creating Your First Entity/overview-of-jpa-and-creating-your-first-entity-slides.pptx
@@ -3093,12 +3093,23 @@
               </a:rPr>
               <a:t> </a:t>
             </a:r>
-            <a:r>
-              <a:rPr sz="3950" dirty="0">
-                <a:latin typeface="Verdana" panose="020B0604030504040204"/>
-                <a:cs typeface="Verdana" panose="020B0604030504040204"/>
-              </a:rPr>
-              <a:t>pgAdmin 4</a:t>
+            <a:endParaRPr sz="3950" spc="-1375" dirty="0">
+              <a:latin typeface="Verdana" panose="020B0604030504040204"/>
+              <a:cs typeface="Verdana" panose="020B0604030504040204"/>
+            </a:endParaRPr>
+          </a:p>
+          <a:p>
+            <a:pPr marL="12700" marR="5080">
+              <a:lnSpc>
+                <a:spcPct val="164000"/>
+              </a:lnSpc>
+            </a:pPr>
+            <a:r>
+              <a:rPr lang="en-US" sz="3950" dirty="0">
+                <a:latin typeface="Verdana" panose="020B0604030504040204"/>
+                <a:cs typeface="Verdana" panose="020B0604030504040204"/>
+              </a:rPr>
+              <a:t>MySQL Workbench</a:t>
             </a:r>
             <a:endParaRPr sz="3950" dirty="0">
               <a:latin typeface="Verdana" panose="020B0604030504040204"/>

</xml_diff>